<commit_message>
updated progess update 3
</commit_message>
<xml_diff>
--- a/progress update 3.pptx
+++ b/progress update 3.pptx
@@ -5,10 +5,10 @@
     <p:sldMasterId id="2147483648" r:id="rId4"/>
   </p:sldMasterIdLst>
   <p:notesMasterIdLst>
-    <p:notesMasterId r:id="rId14"/>
+    <p:notesMasterId r:id="rId15"/>
   </p:notesMasterIdLst>
   <p:handoutMasterIdLst>
-    <p:handoutMasterId r:id="rId15"/>
+    <p:handoutMasterId r:id="rId16"/>
   </p:handoutMasterIdLst>
   <p:sldIdLst>
     <p:sldId id="256" r:id="rId5"/>
@@ -19,7 +19,8 @@
     <p:sldId id="290" r:id="rId10"/>
     <p:sldId id="291" r:id="rId11"/>
     <p:sldId id="292" r:id="rId12"/>
-    <p:sldId id="293" r:id="rId13"/>
+    <p:sldId id="294" r:id="rId13"/>
+    <p:sldId id="293" r:id="rId14"/>
   </p:sldIdLst>
   <p:sldSz cx="12192000" cy="6858000"/>
   <p:notesSz cx="6858000" cy="9144000"/>
@@ -25542,6 +25543,220 @@
 </p:sld>
 </file>
 
+<file path=ppt/slides/slide10.xml><?xml version="1.0" encoding="utf-8"?>
+<p:sld xmlns:a="http://schemas.openxmlformats.org/drawingml/2006/main" xmlns:r="http://schemas.openxmlformats.org/officeDocument/2006/relationships" xmlns:p="http://schemas.openxmlformats.org/presentationml/2006/main">
+  <p:cSld>
+    <p:spTree>
+      <p:nvGrpSpPr>
+        <p:cNvPr id="1" name=""/>
+        <p:cNvGrpSpPr/>
+        <p:nvPr/>
+      </p:nvGrpSpPr>
+      <p:grpSpPr>
+        <a:xfrm>
+          <a:off x="0" y="0"/>
+          <a:ext cx="0" cy="0"/>
+          <a:chOff x="0" y="0"/>
+          <a:chExt cx="0" cy="0"/>
+        </a:xfrm>
+      </p:grpSpPr>
+      <p:sp>
+        <p:nvSpPr>
+          <p:cNvPr id="2" name="Slide Number Placeholder 1">
+            <a:extLst>
+              <a:ext uri="{FF2B5EF4-FFF2-40B4-BE49-F238E27FC236}">
+                <a16:creationId xmlns:a16="http://schemas.microsoft.com/office/drawing/2014/main" id="{520FC4EE-F318-4344-9E3C-B950ADB63865}"/>
+              </a:ext>
+            </a:extLst>
+          </p:cNvPr>
+          <p:cNvSpPr>
+            <a:spLocks noGrp="1"/>
+          </p:cNvSpPr>
+          <p:nvPr>
+            <p:ph type="sldNum" sz="quarter" idx="12"/>
+          </p:nvPr>
+        </p:nvSpPr>
+        <p:spPr/>
+        <p:txBody>
+          <a:bodyPr/>
+          <a:lstStyle/>
+          <a:p>
+            <a:fld id="{C263D6C4-4840-40CC-AC84-17E24B3B7BDE}" type="slidenum">
+              <a:rPr lang="en-US" smtClean="0"/>
+              <a:pPr/>
+              <a:t>10</a:t>
+            </a:fld>
+            <a:endParaRPr lang="en-US" dirty="0"/>
+          </a:p>
+        </p:txBody>
+      </p:sp>
+      <p:sp>
+        <p:nvSpPr>
+          <p:cNvPr id="8" name="Text Placeholder 7">
+            <a:extLst>
+              <a:ext uri="{FF2B5EF4-FFF2-40B4-BE49-F238E27FC236}">
+                <a16:creationId xmlns:a16="http://schemas.microsoft.com/office/drawing/2014/main" id="{47DC4E62-1A34-4F98-A451-214F1808519C}"/>
+              </a:ext>
+            </a:extLst>
+          </p:cNvPr>
+          <p:cNvSpPr>
+            <a:spLocks noGrp="1"/>
+          </p:cNvSpPr>
+          <p:nvPr>
+            <p:ph type="body" sz="quarter" idx="2"/>
+          </p:nvPr>
+        </p:nvSpPr>
+        <p:spPr>
+          <a:xfrm>
+            <a:off x="444501" y="1586706"/>
+            <a:ext cx="8907318" cy="3920476"/>
+          </a:xfrm>
+        </p:spPr>
+        <p:txBody>
+          <a:bodyPr/>
+          <a:lstStyle/>
+          <a:p>
+            <a:r>
+              <a:rPr lang="en-IN" sz="1800" dirty="0">
+                <a:latin typeface="Trebuchet MS (Headings)"/>
+              </a:rPr>
+              <a:t>Test out best models for classification, </a:t>
+            </a:r>
+            <a:r>
+              <a:rPr lang="en-IN" sz="1800" dirty="0" err="1">
+                <a:latin typeface="Trebuchet MS (Headings)"/>
+              </a:rPr>
+              <a:t>hypertune</a:t>
+            </a:r>
+            <a:r>
+              <a:rPr lang="en-IN" sz="1800" dirty="0">
+                <a:latin typeface="Trebuchet MS (Headings)"/>
+              </a:rPr>
+              <a:t> it for better performance.</a:t>
+            </a:r>
+          </a:p>
+          <a:p>
+            <a:r>
+              <a:rPr lang="en-IN" sz="1800" dirty="0" err="1">
+                <a:latin typeface="Trebuchet MS (Headings)"/>
+              </a:rPr>
+              <a:t>Hypertune</a:t>
+            </a:r>
+            <a:r>
+              <a:rPr lang="en-IN" sz="1800" dirty="0">
+                <a:latin typeface="Trebuchet MS (Headings)"/>
+              </a:rPr>
+              <a:t> best model for regression, retrain this model on individual bins, use this for prediction.</a:t>
+            </a:r>
+          </a:p>
+          <a:p>
+            <a:r>
+              <a:rPr lang="en-IN" dirty="0">
+                <a:latin typeface="Trebuchet MS (Headings)"/>
+              </a:rPr>
+              <a:t>Generate a pipeline, evaluate performance.</a:t>
+            </a:r>
+          </a:p>
+          <a:p>
+            <a:r>
+              <a:rPr lang="en-IN" sz="1800" dirty="0">
+                <a:latin typeface="Trebuchet MS (Headings)"/>
+              </a:rPr>
+              <a:t>If time permits run a LSTM on pre-trained models features to extract </a:t>
+            </a:r>
+            <a:r>
+              <a:rPr lang="en-IN" dirty="0">
+                <a:latin typeface="Trebuchet MS (Headings)"/>
+              </a:rPr>
+              <a:t>patterns in-order to improve the predictions.</a:t>
+            </a:r>
+          </a:p>
+          <a:p>
+            <a:endParaRPr lang="en-IN" sz="1800" dirty="0">
+              <a:latin typeface="Trebuchet MS (Headings)"/>
+            </a:endParaRPr>
+          </a:p>
+        </p:txBody>
+      </p:sp>
+      <p:sp>
+        <p:nvSpPr>
+          <p:cNvPr id="5" name="Title 3">
+            <a:extLst>
+              <a:ext uri="{FF2B5EF4-FFF2-40B4-BE49-F238E27FC236}">
+                <a16:creationId xmlns:a16="http://schemas.microsoft.com/office/drawing/2014/main" id="{09D376F8-1019-4E2E-92C9-9B13F8B8D363}"/>
+              </a:ext>
+            </a:extLst>
+          </p:cNvPr>
+          <p:cNvSpPr txBox="1">
+            <a:spLocks/>
+          </p:cNvSpPr>
+          <p:nvPr/>
+        </p:nvSpPr>
+        <p:spPr>
+          <a:xfrm>
+            <a:off x="596900" y="597671"/>
+            <a:ext cx="11214100" cy="535531"/>
+          </a:xfrm>
+          <a:prstGeom prst="rect">
+            <a:avLst/>
+          </a:prstGeom>
+        </p:spPr>
+        <p:txBody>
+          <a:bodyPr vert="horz" wrap="square" lIns="91440" tIns="45720" rIns="91440" bIns="45720" rtlCol="0" anchor="t">
+            <a:spAutoFit/>
+          </a:bodyPr>
+          <a:lstStyle>
+            <a:lvl1pPr algn="l" defTabSz="914400" rtl="0" eaLnBrk="1" latinLnBrk="0" hangingPunct="1">
+              <a:lnSpc>
+                <a:spcPct val="90000"/>
+              </a:lnSpc>
+              <a:spcBef>
+                <a:spcPct val="0"/>
+              </a:spcBef>
+              <a:buNone/>
+              <a:defRPr lang="en-GB" sz="3200" b="1" kern="1200" spc="-70" baseline="0" dirty="0">
+                <a:solidFill>
+                  <a:schemeClr val="bg1"/>
+                </a:solidFill>
+                <a:latin typeface="+mj-lt"/>
+                <a:ea typeface="+mj-ea"/>
+                <a:cs typeface="+mj-cs"/>
+              </a:defRPr>
+            </a:lvl1pPr>
+          </a:lstStyle>
+          <a:p>
+            <a:r>
+              <a:rPr lang="en-US" dirty="0"/>
+              <a:t>Next Steps</a:t>
+            </a:r>
+          </a:p>
+        </p:txBody>
+      </p:sp>
+    </p:spTree>
+    <p:extLst>
+      <p:ext uri="{BB962C8B-B14F-4D97-AF65-F5344CB8AC3E}">
+        <p14:creationId xmlns:p14="http://schemas.microsoft.com/office/powerpoint/2010/main" val="1445487741"/>
+      </p:ext>
+    </p:extLst>
+  </p:cSld>
+  <p:clrMapOvr>
+    <a:masterClrMapping/>
+  </p:clrMapOvr>
+  <mc:AlternateContent xmlns:mc="http://schemas.openxmlformats.org/markup-compatibility/2006" xmlns:p14="http://schemas.microsoft.com/office/powerpoint/2010/main">
+    <mc:Choice Requires="p14">
+      <p:transition spd="med" p14:dur="700">
+        <p:fade/>
+      </p:transition>
+    </mc:Choice>
+    <mc:Fallback xmlns="">
+      <p:transition spd="med">
+        <p:fade/>
+      </p:transition>
+    </mc:Fallback>
+  </mc:AlternateContent>
+</p:sld>
+</file>
+
 <file path=ppt/slides/slide2.xml><?xml version="1.0" encoding="utf-8"?>
 <p:sld xmlns:a="http://schemas.openxmlformats.org/drawingml/2006/main" xmlns:r="http://schemas.openxmlformats.org/officeDocument/2006/relationships" xmlns:p="http://schemas.openxmlformats.org/presentationml/2006/main">
   <p:cSld>
@@ -26871,10 +27086,43 @@
       </p:grpSpPr>
       <p:sp>
         <p:nvSpPr>
-          <p:cNvPr id="2" name="Slide Number Placeholder 1">
+          <p:cNvPr id="2" name="Title 1">
             <a:extLst>
               <a:ext uri="{FF2B5EF4-FFF2-40B4-BE49-F238E27FC236}">
-                <a16:creationId xmlns:a16="http://schemas.microsoft.com/office/drawing/2014/main" id="{520FC4EE-F318-4344-9E3C-B950ADB63865}"/>
+                <a16:creationId xmlns:a16="http://schemas.microsoft.com/office/drawing/2014/main" id="{82313CF7-12A3-4808-A723-1B9EA53B8F2B}"/>
+              </a:ext>
+            </a:extLst>
+          </p:cNvPr>
+          <p:cNvSpPr>
+            <a:spLocks noGrp="1"/>
+          </p:cNvSpPr>
+          <p:nvPr>
+            <p:ph type="title"/>
+          </p:nvPr>
+        </p:nvSpPr>
+        <p:spPr>
+          <a:xfrm>
+            <a:off x="444500" y="603841"/>
+            <a:ext cx="11214100" cy="535531"/>
+          </a:xfrm>
+        </p:spPr>
+        <p:txBody>
+          <a:bodyPr/>
+          <a:lstStyle/>
+          <a:p>
+            <a:r>
+              <a:rPr lang="en-IN" dirty="0"/>
+              <a:t>Next Steps</a:t>
+            </a:r>
+          </a:p>
+        </p:txBody>
+      </p:sp>
+      <p:sp>
+        <p:nvSpPr>
+          <p:cNvPr id="3" name="Slide Number Placeholder 2">
+            <a:extLst>
+              <a:ext uri="{FF2B5EF4-FFF2-40B4-BE49-F238E27FC236}">
+                <a16:creationId xmlns:a16="http://schemas.microsoft.com/office/drawing/2014/main" id="{CC562ED4-8B8C-461E-A0F0-6868D4FF2B15}"/>
               </a:ext>
             </a:extLst>
           </p:cNvPr>
@@ -26891,20 +27139,20 @@
           <a:lstStyle/>
           <a:p>
             <a:fld id="{C263D6C4-4840-40CC-AC84-17E24B3B7BDE}" type="slidenum">
-              <a:rPr lang="en-US" smtClean="0"/>
+              <a:rPr lang="en-US" noProof="0" smtClean="0"/>
               <a:pPr/>
               <a:t>9</a:t>
             </a:fld>
-            <a:endParaRPr lang="en-US" dirty="0"/>
+            <a:endParaRPr lang="en-US" noProof="0" dirty="0"/>
           </a:p>
         </p:txBody>
       </p:sp>
       <p:sp>
         <p:nvSpPr>
-          <p:cNvPr id="8" name="Text Placeholder 7">
+          <p:cNvPr id="4" name="Text Placeholder 3">
             <a:extLst>
               <a:ext uri="{FF2B5EF4-FFF2-40B4-BE49-F238E27FC236}">
-                <a16:creationId xmlns:a16="http://schemas.microsoft.com/office/drawing/2014/main" id="{47DC4E62-1A34-4F98-A451-214F1808519C}"/>
+                <a16:creationId xmlns:a16="http://schemas.microsoft.com/office/drawing/2014/main" id="{39D3AC5B-AAFF-4816-812B-AB77458A0928}"/>
               </a:ext>
             </a:extLst>
           </p:cNvPr>
@@ -26912,165 +27160,137 @@
             <a:spLocks noGrp="1"/>
           </p:cNvSpPr>
           <p:nvPr>
-            <p:ph type="body" sz="quarter" idx="2"/>
+            <p:ph type="body" sz="quarter" idx="13"/>
           </p:nvPr>
         </p:nvSpPr>
-        <p:spPr>
-          <a:xfrm>
-            <a:off x="444501" y="1586706"/>
-            <a:ext cx="8907318" cy="3920476"/>
-          </a:xfrm>
-        </p:spPr>
+        <p:spPr/>
         <p:txBody>
           <a:bodyPr/>
           <a:lstStyle/>
           <a:p>
-            <a:r>
-              <a:rPr lang="en-IN" sz="1800" dirty="0">
-                <a:latin typeface="Trebuchet MS (Headings)"/>
-              </a:rPr>
-              <a:t>Generate data for classification model. Data Binning and Train, Test split</a:t>
-            </a:r>
-          </a:p>
-          <a:p>
-            <a:r>
-              <a:rPr lang="en-IN" sz="1800" dirty="0">
-                <a:latin typeface="Trebuchet MS (Headings)"/>
-              </a:rPr>
-              <a:t>Test out best models for classification, </a:t>
-            </a:r>
-            <a:r>
-              <a:rPr lang="en-IN" sz="1800" dirty="0" err="1">
-                <a:latin typeface="Trebuchet MS (Headings)"/>
-              </a:rPr>
-              <a:t>hypertune</a:t>
-            </a:r>
-            <a:r>
-              <a:rPr lang="en-IN" sz="1800" dirty="0">
-                <a:latin typeface="Trebuchet MS (Headings)"/>
-              </a:rPr>
-              <a:t> it for better performance.</a:t>
-            </a:r>
-          </a:p>
-          <a:p>
-            <a:r>
-              <a:rPr lang="en-IN" sz="1800" dirty="0" err="1">
-                <a:latin typeface="Trebuchet MS (Headings)"/>
-              </a:rPr>
-              <a:t>Hypertune</a:t>
-            </a:r>
-            <a:r>
-              <a:rPr lang="en-IN" sz="1800" dirty="0">
-                <a:latin typeface="Trebuchet MS (Headings)"/>
-              </a:rPr>
-              <a:t> best model for regression, retrain this model on individual bins, use this for prediction.</a:t>
-            </a:r>
-          </a:p>
-          <a:p>
-            <a:r>
-              <a:rPr lang="en-IN" dirty="0">
-                <a:latin typeface="Trebuchet MS (Headings)"/>
-              </a:rPr>
-              <a:t>Generate a pipeline, evaluate performance.</a:t>
-            </a:r>
-          </a:p>
-          <a:p>
-            <a:r>
-              <a:rPr lang="en-IN" sz="1800" dirty="0">
-                <a:latin typeface="Trebuchet MS (Headings)"/>
-              </a:rPr>
-              <a:t>If time permits run a LSTM on pre-trained models features to extract </a:t>
-            </a:r>
-            <a:r>
-              <a:rPr lang="en-IN" dirty="0">
-                <a:latin typeface="Trebuchet MS (Headings)"/>
-              </a:rPr>
-              <a:t>patterns in-order to improve the predictions.</a:t>
-            </a:r>
-          </a:p>
-          <a:p>
-            <a:endParaRPr lang="en-IN" sz="1800" dirty="0">
-              <a:latin typeface="Trebuchet MS (Headings)"/>
-            </a:endParaRPr>
+            <a:endParaRPr lang="en-IN" dirty="0"/>
           </a:p>
         </p:txBody>
       </p:sp>
       <p:sp>
         <p:nvSpPr>
-          <p:cNvPr id="5" name="Title 3">
+          <p:cNvPr id="6" name="Rectangle 5">
             <a:extLst>
               <a:ext uri="{FF2B5EF4-FFF2-40B4-BE49-F238E27FC236}">
-                <a16:creationId xmlns:a16="http://schemas.microsoft.com/office/drawing/2014/main" id="{09D376F8-1019-4E2E-92C9-9B13F8B8D363}"/>
+                <a16:creationId xmlns:a16="http://schemas.microsoft.com/office/drawing/2014/main" id="{B8736643-8EEF-4B22-A47C-2ED7F21D8292}"/>
               </a:ext>
             </a:extLst>
           </p:cNvPr>
-          <p:cNvSpPr txBox="1">
-            <a:spLocks/>
-          </p:cNvSpPr>
+          <p:cNvSpPr/>
           <p:nvPr/>
         </p:nvSpPr>
         <p:spPr>
           <a:xfrm>
-            <a:off x="596900" y="597671"/>
-            <a:ext cx="11214100" cy="535531"/>
+            <a:off x="8545015" y="1836280"/>
+            <a:ext cx="3457857" cy="3495964"/>
+          </a:xfrm>
+          <a:prstGeom prst="rect">
+            <a:avLst/>
+          </a:prstGeom>
+          <a:solidFill>
+            <a:schemeClr val="bg1"/>
+          </a:solidFill>
+        </p:spPr>
+        <p:style>
+          <a:lnRef idx="2">
+            <a:schemeClr val="accent1">
+              <a:shade val="50000"/>
+            </a:schemeClr>
+          </a:lnRef>
+          <a:fillRef idx="1">
+            <a:schemeClr val="accent1"/>
+          </a:fillRef>
+          <a:effectRef idx="0">
+            <a:schemeClr val="accent1"/>
+          </a:effectRef>
+          <a:fontRef idx="minor">
+            <a:schemeClr val="lt1"/>
+          </a:fontRef>
+        </p:style>
+        <p:txBody>
+          <a:bodyPr rtlCol="0" anchor="ctr"/>
+          <a:lstStyle/>
+          <a:p>
+            <a:pPr algn="ctr"/>
+            <a:endParaRPr lang="en-IN"/>
+          </a:p>
+        </p:txBody>
+      </p:sp>
+      <p:pic>
+        <p:nvPicPr>
+          <p:cNvPr id="9" name="Picture 8">
+            <a:extLst>
+              <a:ext uri="{FF2B5EF4-FFF2-40B4-BE49-F238E27FC236}">
+                <a16:creationId xmlns:a16="http://schemas.microsoft.com/office/drawing/2014/main" id="{CD1635D3-C5E2-4557-B969-7E5B67A56CB9}"/>
+              </a:ext>
+            </a:extLst>
+          </p:cNvPr>
+          <p:cNvPicPr>
+            <a:picLocks noChangeAspect="1"/>
+          </p:cNvPicPr>
+          <p:nvPr/>
+        </p:nvPicPr>
+        <p:blipFill>
+          <a:blip r:embed="rId2"/>
+          <a:stretch>
+            <a:fillRect/>
+          </a:stretch>
+        </p:blipFill>
+        <p:spPr>
+          <a:xfrm>
+            <a:off x="189128" y="1352593"/>
+            <a:ext cx="8010659" cy="4805464"/>
           </a:xfrm>
           <a:prstGeom prst="rect">
             <a:avLst/>
           </a:prstGeom>
         </p:spPr>
-        <p:txBody>
-          <a:bodyPr vert="horz" wrap="square" lIns="91440" tIns="45720" rIns="91440" bIns="45720" rtlCol="0" anchor="t">
-            <a:spAutoFit/>
-          </a:bodyPr>
-          <a:lstStyle>
-            <a:lvl1pPr algn="l" defTabSz="914400" rtl="0" eaLnBrk="1" latinLnBrk="0" hangingPunct="1">
-              <a:lnSpc>
-                <a:spcPct val="90000"/>
-              </a:lnSpc>
-              <a:spcBef>
-                <a:spcPct val="0"/>
-              </a:spcBef>
-              <a:buNone/>
-              <a:defRPr lang="en-GB" sz="3200" b="1" kern="1200" spc="-70" baseline="0" dirty="0">
-                <a:solidFill>
-                  <a:schemeClr val="bg1"/>
-                </a:solidFill>
-                <a:latin typeface="+mj-lt"/>
-                <a:ea typeface="+mj-ea"/>
-                <a:cs typeface="+mj-cs"/>
-              </a:defRPr>
-            </a:lvl1pPr>
-          </a:lstStyle>
-          <a:p>
-            <a:r>
-              <a:rPr lang="en-US" dirty="0"/>
-              <a:t>Next Steps</a:t>
-            </a:r>
-          </a:p>
-        </p:txBody>
-      </p:sp>
+      </p:pic>
+      <p:pic>
+        <p:nvPicPr>
+          <p:cNvPr id="11" name="Picture 10" descr="Chart, pie chart&#10;&#10;Description automatically generated">
+            <a:extLst>
+              <a:ext uri="{FF2B5EF4-FFF2-40B4-BE49-F238E27FC236}">
+                <a16:creationId xmlns:a16="http://schemas.microsoft.com/office/drawing/2014/main" id="{88DC92A0-A3D7-471C-8345-F8D7A97DDA18}"/>
+              </a:ext>
+            </a:extLst>
+          </p:cNvPr>
+          <p:cNvPicPr>
+            <a:picLocks noChangeAspect="1"/>
+          </p:cNvPicPr>
+          <p:nvPr/>
+        </p:nvPicPr>
+        <p:blipFill>
+          <a:blip r:embed="rId3"/>
+          <a:stretch>
+            <a:fillRect/>
+          </a:stretch>
+        </p:blipFill>
+        <p:spPr>
+          <a:xfrm>
+            <a:off x="8503352" y="1851189"/>
+            <a:ext cx="3499520" cy="3641633"/>
+          </a:xfrm>
+          <a:prstGeom prst="rect">
+            <a:avLst/>
+          </a:prstGeom>
+        </p:spPr>
+      </p:pic>
     </p:spTree>
     <p:extLst>
       <p:ext uri="{BB962C8B-B14F-4D97-AF65-F5344CB8AC3E}">
-        <p14:creationId xmlns:p14="http://schemas.microsoft.com/office/powerpoint/2010/main" val="1445487741"/>
+        <p14:creationId xmlns:p14="http://schemas.microsoft.com/office/powerpoint/2010/main" val="3223477672"/>
       </p:ext>
     </p:extLst>
   </p:cSld>
   <p:clrMapOvr>
     <a:masterClrMapping/>
   </p:clrMapOvr>
-  <mc:AlternateContent xmlns:mc="http://schemas.openxmlformats.org/markup-compatibility/2006" xmlns:p14="http://schemas.microsoft.com/office/powerpoint/2010/main">
-    <mc:Choice Requires="p14">
-      <p:transition spd="med" p14:dur="700">
-        <p:fade/>
-      </p:transition>
-    </mc:Choice>
-    <mc:Fallback xmlns="">
-      <p:transition spd="med">
-        <p:fade/>
-      </p:transition>
-    </mc:Fallback>
-  </mc:AlternateContent>
 </p:sld>
 </file>
 
@@ -27866,23 +28086,6 @@
 </file>
 
 <file path=customXml/item1.xml><?xml version="1.0" encoding="utf-8"?>
-<p:properties xmlns:p="http://schemas.microsoft.com/office/2006/metadata/properties" xmlns:xsi="http://www.w3.org/2001/XMLSchema-instance" xmlns:pc="http://schemas.microsoft.com/office/infopath/2007/PartnerControls">
-  <documentManagement>
-    <MediaServiceKeyPoints xmlns="71af3243-3dd4-4a8d-8c0d-dd76da1f02a5" xsi:nil="true"/>
-  </documentManagement>
-</p:properties>
-</file>
-
-<file path=customXml/item2.xml><?xml version="1.0" encoding="utf-8"?>
-<?mso-contentType ?>
-<FormTemplates xmlns="http://schemas.microsoft.com/sharepoint/v3/contenttype/forms">
-  <Display>DocumentLibraryForm</Display>
-  <Edit>DocumentLibraryForm</Edit>
-  <New>DocumentLibraryForm</New>
-</FormTemplates>
-</file>
-
-<file path=customXml/item3.xml><?xml version="1.0" encoding="utf-8"?>
 <ct:contentTypeSchema xmlns:ct="http://schemas.microsoft.com/office/2006/metadata/contentType" xmlns:ma="http://schemas.microsoft.com/office/2006/metadata/properties/metaAttributes" ct:_="" ma:_="" ma:contentTypeName="Document" ma:contentTypeID="0x01010079F111ED35F8CC479449609E8A0923A6" ma:contentTypeVersion="11" ma:contentTypeDescription="Create a new document." ma:contentTypeScope="" ma:versionID="96291512c1ee715ab617f4c07df79fc1">
   <xsd:schema xmlns:xsd="http://www.w3.org/2001/XMLSchema" xmlns:xs="http://www.w3.org/2001/XMLSchema" xmlns:p="http://schemas.microsoft.com/office/2006/metadata/properties" xmlns:ns2="71af3243-3dd4-4a8d-8c0d-dd76da1f02a5" xmlns:ns3="16c05727-aa75-4e4a-9b5f-8a80a1165891" targetNamespace="http://schemas.microsoft.com/office/2006/metadata/properties" ma:root="true" ma:fieldsID="8256c27c40ca5c40ce1cf6c44f0205df" ns2:_="" ns3:_="">
     <xsd:import namespace="71af3243-3dd4-4a8d-8c0d-dd76da1f02a5"/>
@@ -28093,25 +28296,24 @@
 </ct:contentTypeSchema>
 </file>
 
-<file path=customXml/itemProps1.xml><?xml version="1.0" encoding="utf-8"?>
-<ds:datastoreItem xmlns:ds="http://schemas.openxmlformats.org/officeDocument/2006/customXml" ds:itemID="{F5757914-1161-4661-9696-421FD6935CDD}">
-  <ds:schemaRefs>
-    <ds:schemaRef ds:uri="http://schemas.microsoft.com/office/2006/metadata/properties"/>
-    <ds:schemaRef ds:uri="http://schemas.microsoft.com/office/infopath/2007/PartnerControls"/>
-    <ds:schemaRef ds:uri="71af3243-3dd4-4a8d-8c0d-dd76da1f02a5"/>
-  </ds:schemaRefs>
-</ds:datastoreItem>
+<file path=customXml/item2.xml><?xml version="1.0" encoding="utf-8"?>
+<?mso-contentType ?>
+<FormTemplates xmlns="http://schemas.microsoft.com/sharepoint/v3/contenttype/forms">
+  <Display>DocumentLibraryForm</Display>
+  <Edit>DocumentLibraryForm</Edit>
+  <New>DocumentLibraryForm</New>
+</FormTemplates>
 </file>
 
-<file path=customXml/itemProps2.xml><?xml version="1.0" encoding="utf-8"?>
-<ds:datastoreItem xmlns:ds="http://schemas.openxmlformats.org/officeDocument/2006/customXml" ds:itemID="{5B26E0C9-B2AA-42E6-97B6-E1B7D9EAF129}">
-  <ds:schemaRefs>
-    <ds:schemaRef ds:uri="http://schemas.microsoft.com/sharepoint/v3/contenttype/forms"/>
-  </ds:schemaRefs>
-</ds:datastoreItem>
+<file path=customXml/item3.xml><?xml version="1.0" encoding="utf-8"?>
+<p:properties xmlns:p="http://schemas.microsoft.com/office/2006/metadata/properties" xmlns:xsi="http://www.w3.org/2001/XMLSchema-instance" xmlns:pc="http://schemas.microsoft.com/office/infopath/2007/PartnerControls">
+  <documentManagement>
+    <MediaServiceKeyPoints xmlns="71af3243-3dd4-4a8d-8c0d-dd76da1f02a5" xsi:nil="true"/>
+  </documentManagement>
+</p:properties>
 </file>
 
-<file path=customXml/itemProps3.xml><?xml version="1.0" encoding="utf-8"?>
+<file path=customXml/itemProps1.xml><?xml version="1.0" encoding="utf-8"?>
 <ds:datastoreItem xmlns:ds="http://schemas.openxmlformats.org/officeDocument/2006/customXml" ds:itemID="{4C103400-4A22-4E35-B588-4C4D42638959}">
   <ds:schemaRefs>
     <ds:schemaRef ds:uri="http://schemas.microsoft.com/office/2006/metadata/contentType"/>
@@ -28128,4 +28330,22 @@
     <ds:schemaRef ds:uri="http://schemas.microsoft.com/internal/obd"/>
   </ds:schemaRefs>
 </ds:datastoreItem>
+</file>
+
+<file path=customXml/itemProps2.xml><?xml version="1.0" encoding="utf-8"?>
+<ds:datastoreItem xmlns:ds="http://schemas.openxmlformats.org/officeDocument/2006/customXml" ds:itemID="{5B26E0C9-B2AA-42E6-97B6-E1B7D9EAF129}">
+  <ds:schemaRefs>
+    <ds:schemaRef ds:uri="http://schemas.microsoft.com/sharepoint/v3/contenttype/forms"/>
+  </ds:schemaRefs>
+</ds:datastoreItem>
+</file>
+
+<file path=customXml/itemProps3.xml><?xml version="1.0" encoding="utf-8"?>
+<ds:datastoreItem xmlns:ds="http://schemas.openxmlformats.org/officeDocument/2006/customXml" ds:itemID="{F5757914-1161-4661-9696-421FD6935CDD}">
+  <ds:schemaRefs>
+    <ds:schemaRef ds:uri="http://schemas.microsoft.com/office/2006/metadata/properties"/>
+    <ds:schemaRef ds:uri="http://schemas.microsoft.com/office/infopath/2007/PartnerControls"/>
+    <ds:schemaRef ds:uri="71af3243-3dd4-4a8d-8c0d-dd76da1f02a5"/>
+  </ds:schemaRefs>
+</ds:datastoreItem>
 </file>
</xml_diff>

<commit_message>
Progress Update 3 PPT
</commit_message>
<xml_diff>
--- a/progress update 3.pptx
+++ b/progress update 3.pptx
@@ -236,7 +236,7 @@
           <a:p>
             <a:fld id="{1CA5457B-CDAE-4DEB-AEC8-C82DE2312E37}" type="datetimeFigureOut">
               <a:rPr lang="en-US" smtClean="0"/>
-              <a:t>11/23/2021</a:t>
+              <a:t>11/27/2021</a:t>
             </a:fld>
             <a:endParaRPr lang="en-US" dirty="0"/>
           </a:p>
@@ -413,7 +413,7 @@
           <a:p>
             <a:fld id="{090B78EA-28CE-41D8-9043-90E391E5F567}" type="datetimeFigureOut">
               <a:rPr lang="en-US" noProof="0" smtClean="0"/>
-              <a:t>11/23/2021</a:t>
+              <a:t>11/27/2021</a:t>
             </a:fld>
             <a:endParaRPr lang="en-US" noProof="0" dirty="0"/>
           </a:p>
@@ -25771,7 +25771,10 @@
           <a:bodyPr/>
           <a:lstStyle/>
           <a:p>
-            <a:endParaRPr lang="en-IN" dirty="0"/>
+            <a:r>
+              <a:rPr lang="en-IN" dirty="0"/>
+              <a:t>Thank You</a:t>
+            </a:r>
           </a:p>
         </p:txBody>
       </p:sp>
@@ -27315,7 +27318,7 @@
         </p:nvGrpSpPr>
         <p:grpSpPr>
           <a:xfrm>
-            <a:off x="8455159" y="2235776"/>
+            <a:off x="8455159" y="2251275"/>
             <a:ext cx="3499520" cy="3656542"/>
             <a:chOff x="8455159" y="2155877"/>
             <a:chExt cx="3499520" cy="3656542"/>
@@ -28206,23 +28209,6 @@
 </file>
 
 <file path=customXml/item1.xml><?xml version="1.0" encoding="utf-8"?>
-<p:properties xmlns:p="http://schemas.microsoft.com/office/2006/metadata/properties" xmlns:xsi="http://www.w3.org/2001/XMLSchema-instance" xmlns:pc="http://schemas.microsoft.com/office/infopath/2007/PartnerControls">
-  <documentManagement>
-    <MediaServiceKeyPoints xmlns="71af3243-3dd4-4a8d-8c0d-dd76da1f02a5" xsi:nil="true"/>
-  </documentManagement>
-</p:properties>
-</file>
-
-<file path=customXml/item2.xml><?xml version="1.0" encoding="utf-8"?>
-<?mso-contentType ?>
-<FormTemplates xmlns="http://schemas.microsoft.com/sharepoint/v3/contenttype/forms">
-  <Display>DocumentLibraryForm</Display>
-  <Edit>DocumentLibraryForm</Edit>
-  <New>DocumentLibraryForm</New>
-</FormTemplates>
-</file>
-
-<file path=customXml/item3.xml><?xml version="1.0" encoding="utf-8"?>
 <ct:contentTypeSchema xmlns:ct="http://schemas.microsoft.com/office/2006/metadata/contentType" xmlns:ma="http://schemas.microsoft.com/office/2006/metadata/properties/metaAttributes" ct:_="" ma:_="" ma:contentTypeName="Document" ma:contentTypeID="0x01010079F111ED35F8CC479449609E8A0923A6" ma:contentTypeVersion="11" ma:contentTypeDescription="Create a new document." ma:contentTypeScope="" ma:versionID="96291512c1ee715ab617f4c07df79fc1">
   <xsd:schema xmlns:xsd="http://www.w3.org/2001/XMLSchema" xmlns:xs="http://www.w3.org/2001/XMLSchema" xmlns:p="http://schemas.microsoft.com/office/2006/metadata/properties" xmlns:ns2="71af3243-3dd4-4a8d-8c0d-dd76da1f02a5" xmlns:ns3="16c05727-aa75-4e4a-9b5f-8a80a1165891" targetNamespace="http://schemas.microsoft.com/office/2006/metadata/properties" ma:root="true" ma:fieldsID="8256c27c40ca5c40ce1cf6c44f0205df" ns2:_="" ns3:_="">
     <xsd:import namespace="71af3243-3dd4-4a8d-8c0d-dd76da1f02a5"/>
@@ -28433,25 +28419,24 @@
 </ct:contentTypeSchema>
 </file>
 
-<file path=customXml/itemProps1.xml><?xml version="1.0" encoding="utf-8"?>
-<ds:datastoreItem xmlns:ds="http://schemas.openxmlformats.org/officeDocument/2006/customXml" ds:itemID="{F5757914-1161-4661-9696-421FD6935CDD}">
-  <ds:schemaRefs>
-    <ds:schemaRef ds:uri="http://schemas.microsoft.com/office/2006/metadata/properties"/>
-    <ds:schemaRef ds:uri="http://schemas.microsoft.com/office/infopath/2007/PartnerControls"/>
-    <ds:schemaRef ds:uri="71af3243-3dd4-4a8d-8c0d-dd76da1f02a5"/>
-  </ds:schemaRefs>
-</ds:datastoreItem>
+<file path=customXml/item2.xml><?xml version="1.0" encoding="utf-8"?>
+<?mso-contentType ?>
+<FormTemplates xmlns="http://schemas.microsoft.com/sharepoint/v3/contenttype/forms">
+  <Display>DocumentLibraryForm</Display>
+  <Edit>DocumentLibraryForm</Edit>
+  <New>DocumentLibraryForm</New>
+</FormTemplates>
 </file>
 
-<file path=customXml/itemProps2.xml><?xml version="1.0" encoding="utf-8"?>
-<ds:datastoreItem xmlns:ds="http://schemas.openxmlformats.org/officeDocument/2006/customXml" ds:itemID="{5B26E0C9-B2AA-42E6-97B6-E1B7D9EAF129}">
-  <ds:schemaRefs>
-    <ds:schemaRef ds:uri="http://schemas.microsoft.com/sharepoint/v3/contenttype/forms"/>
-  </ds:schemaRefs>
-</ds:datastoreItem>
+<file path=customXml/item3.xml><?xml version="1.0" encoding="utf-8"?>
+<p:properties xmlns:p="http://schemas.microsoft.com/office/2006/metadata/properties" xmlns:xsi="http://www.w3.org/2001/XMLSchema-instance" xmlns:pc="http://schemas.microsoft.com/office/infopath/2007/PartnerControls">
+  <documentManagement>
+    <MediaServiceKeyPoints xmlns="71af3243-3dd4-4a8d-8c0d-dd76da1f02a5" xsi:nil="true"/>
+  </documentManagement>
+</p:properties>
 </file>
 
-<file path=customXml/itemProps3.xml><?xml version="1.0" encoding="utf-8"?>
+<file path=customXml/itemProps1.xml><?xml version="1.0" encoding="utf-8"?>
 <ds:datastoreItem xmlns:ds="http://schemas.openxmlformats.org/officeDocument/2006/customXml" ds:itemID="{4C103400-4A22-4E35-B588-4C4D42638959}">
   <ds:schemaRefs>
     <ds:schemaRef ds:uri="http://schemas.microsoft.com/office/2006/metadata/contentType"/>
@@ -28468,4 +28453,22 @@
     <ds:schemaRef ds:uri="http://schemas.microsoft.com/internal/obd"/>
   </ds:schemaRefs>
 </ds:datastoreItem>
+</file>
+
+<file path=customXml/itemProps2.xml><?xml version="1.0" encoding="utf-8"?>
+<ds:datastoreItem xmlns:ds="http://schemas.openxmlformats.org/officeDocument/2006/customXml" ds:itemID="{5B26E0C9-B2AA-42E6-97B6-E1B7D9EAF129}">
+  <ds:schemaRefs>
+    <ds:schemaRef ds:uri="http://schemas.microsoft.com/sharepoint/v3/contenttype/forms"/>
+  </ds:schemaRefs>
+</ds:datastoreItem>
+</file>
+
+<file path=customXml/itemProps3.xml><?xml version="1.0" encoding="utf-8"?>
+<ds:datastoreItem xmlns:ds="http://schemas.openxmlformats.org/officeDocument/2006/customXml" ds:itemID="{F5757914-1161-4661-9696-421FD6935CDD}">
+  <ds:schemaRefs>
+    <ds:schemaRef ds:uri="http://schemas.microsoft.com/office/2006/metadata/properties"/>
+    <ds:schemaRef ds:uri="http://schemas.microsoft.com/office/infopath/2007/PartnerControls"/>
+    <ds:schemaRef ds:uri="71af3243-3dd4-4a8d-8c0d-dd76da1f02a5"/>
+  </ds:schemaRefs>
+</ds:datastoreItem>
 </file>
</xml_diff>